<commit_message>
added links for download in pptx
</commit_message>
<xml_diff>
--- a/docs/antonio_QTL_practical_MGE.pptx
+++ b/docs/antonio_QTL_practical_MGE.pptx
@@ -3564,7 +3564,7 @@
         </p:spPr>
         <p:txBody>
           <a:bodyPr>
-            <a:normAutofit lnSpcReduction="10000"/>
+            <a:normAutofit fontScale="92500" lnSpcReduction="20000"/>
           </a:bodyPr>
           <a:lstStyle/>
           <a:p>
@@ -3730,6 +3730,18 @@
             </a:r>
           </a:p>
           <a:p>
+            <a:pPr lvl="2"/>
+            <a:r>
+              <a:rPr lang="en-GB" dirty="0">
+                <a:hlinkClick r:id="rId4"/>
+              </a:rPr>
+              <a:t>https://imperiallondon-my.sharepoint.com/:u:/g/personal/aberlang_ic_ac_uk/EU6yTe23kmVCnWqry08nk8YB1x0S6M4unOTIdN5UdJSkZw?e=HsdeKq</a:t>
+            </a:r>
+            <a:endParaRPr lang="en-GB" dirty="0">
+              <a:hlinkClick r:id="rId3"/>
+            </a:endParaRPr>
+          </a:p>
+          <a:p>
             <a:pPr lvl="1"/>
             <a:r>
               <a:rPr lang="en-GB" dirty="0"/>
@@ -3740,7 +3752,7 @@
             <a:pPr lvl="2"/>
             <a:r>
               <a:rPr lang="en-GB" dirty="0">
-                <a:hlinkClick r:id="rId4"/>
+                <a:hlinkClick r:id="rId5"/>
               </a:rPr>
               <a:t>https://github.com/AntonioJBT/teaching_ICL/blob/master/data/README_sim_data.txt</a:t>
             </a:r>

</xml_diff>